<commit_message>
Final version of powerpoint presentation
</commit_message>
<xml_diff>
--- a/CS2043Proj1.pptx
+++ b/CS2043Proj1.pptx
@@ -154,6 +154,7 @@
 <p1510:revInfo xmlns:a="http://schemas.openxmlformats.org/drawingml/2006/main" xmlns:r="http://schemas.openxmlformats.org/officeDocument/2006/relationships" xmlns:p1510="http://schemas.microsoft.com/office/powerpoint/2015/10/main">
   <p1510:revLst>
     <p1510:client id="{3001313F-007F-B4A8-8084-09849CE857FA}" v="5" dt="2020-12-09T13:02:29.144"/>
+    <p1510:client id="{383FC880-206E-650E-E501-EBF63B73F0DE}" v="17" dt="2020-12-14T23:51:17.891"/>
     <p1510:client id="{60C20DFD-674D-EBE4-51E0-EA4829983976}" v="1" dt="2020-11-25T16:37:26.780"/>
     <p1510:client id="{6BDC2148-1737-4A83-8AC3-1CCCAB3A40C5}" v="16" dt="2020-12-06T16:54:11.791"/>
     <p1510:client id="{73A42634-5DA9-4FCF-9C28-7618FB25E4B4}" v="917" dt="2020-11-15T22:46:47.700"/>
@@ -10033,7 +10034,7 @@
           <a:p>
             <a:fld id="{544D676F-4DB5-46B8-8F00-05DB67D5471C}" type="datetimeFigureOut">
               <a:rPr lang="en-US" smtClean="0"/>
-              <a:t>12/9/2020</a:t>
+              <a:t>12/14/2020</a:t>
             </a:fld>
             <a:endParaRPr lang="en-US"/>
           </a:p>
@@ -10266,7 +10267,7 @@
           <a:p>
             <a:fld id="{887BE5AB-3192-4552-A220-BA06EA9D867F}" type="datetimeFigureOut">
               <a:rPr lang="en-US" smtClean="0"/>
-              <a:t>12/9/2020</a:t>
+              <a:t>12/14/2020</a:t>
             </a:fld>
             <a:endParaRPr lang="en-US"/>
           </a:p>
@@ -30274,7 +30275,7 @@
               </a:spcAft>
             </a:pPr>
             <a:r>
-              <a:rPr lang="en-US" sz="5400">
+              <a:rPr lang="en-US" sz="3600" dirty="0">
                 <a:latin typeface="+mj-lt"/>
                 <a:ea typeface="+mj-ea"/>
                 <a:cs typeface="+mj-cs"/>
@@ -30595,7 +30596,7 @@
               <a:buChar char="•"/>
             </a:pPr>
             <a:r>
-              <a:rPr lang="en-US" dirty="0"/>
+              <a:rPr lang="en-US" sz="1200" dirty="0"/>
               <a:t>A socket represents a connection for communication between two users . Multiple individuals in client/server or distributed systems can simultaneously communicate with a single Web server.  Multiple sockets are required to do this. The socket's flow of events starts with a connection-oriented client-to-server model, the socket on the server process waits for requests from a client. To do this, the server first establishes (binds) an address that clients can use to find the server. When the address is established, the server waits for clients to request a service. The client-to-server data exchange takes place when a client connects to the server through a socket. The server performs the client's request and sends the reply back to the client.</a:t>
             </a:r>
           </a:p>
@@ -31990,11 +31991,11 @@
           <a:lstStyle/>
           <a:p>
             <a:r>
-              <a:rPr lang="en-US"/>
+              <a:rPr lang="en-US" sz="3600" dirty="0"/>
               <a:t>          </a:t>
             </a:r>
             <a:r>
-              <a:rPr lang="en-US">
+              <a:rPr lang="en-US" sz="3600" dirty="0">
                 <a:solidFill>
                   <a:srgbClr val="000000"/>
                 </a:solidFill>
@@ -32002,7 +32003,7 @@
               <a:t>      </a:t>
             </a:r>
             <a:r>
-              <a:rPr lang="en-US">
+              <a:rPr lang="en-US" sz="3600" dirty="0">
                 <a:solidFill>
                   <a:schemeClr val="accent1"/>
                 </a:solidFill>
@@ -32041,31 +32042,6 @@
           </a:xfrm>
         </p:spPr>
       </p:pic>
-      <p:sp>
-        <p:nvSpPr>
-          <p:cNvPr id="4" name="Footer Placeholder 3">
-            <a:extLst>
-              <a:ext uri="{FF2B5EF4-FFF2-40B4-BE49-F238E27FC236}">
-                <a16:creationId xmlns:a16="http://schemas.microsoft.com/office/drawing/2014/main" id="{BE3C9C8A-D0C8-4993-B6DE-2553A2908297}"/>
-              </a:ext>
-            </a:extLst>
-          </p:cNvPr>
-          <p:cNvSpPr>
-            <a:spLocks noGrp="1"/>
-          </p:cNvSpPr>
-          <p:nvPr>
-            <p:ph type="ftr" sz="quarter" idx="11"/>
-          </p:nvPr>
-        </p:nvSpPr>
-        <p:spPr/>
-        <p:txBody>
-          <a:bodyPr/>
-          <a:lstStyle/>
-          <a:p>
-            <a:endParaRPr lang="en-US"/>
-          </a:p>
-        </p:txBody>
-      </p:sp>
       <p:sp>
         <p:nvSpPr>
           <p:cNvPr id="5" name="Slide Number Placeholder 4">
@@ -39265,8 +39241,8 @@
         </p:nvSpPr>
         <p:spPr>
           <a:xfrm>
-            <a:off x="890338" y="640080"/>
-            <a:ext cx="3734014" cy="3566160"/>
+            <a:off x="639225" y="700694"/>
+            <a:ext cx="3863900" cy="3566160"/>
           </a:xfrm>
         </p:spPr>
         <p:txBody>
@@ -39281,20 +39257,20 @@
               </a:lnSpc>
             </a:pPr>
             <a:r>
-              <a:rPr lang="en-US"/>
+              <a:rPr lang="en-US" sz="5400" dirty="0"/>
               <a:t>Stakeholders</a:t>
             </a:r>
             <a:br>
-              <a:rPr lang="en-US" sz="4400"/>
+              <a:rPr lang="en-US" sz="4400" dirty="0"/>
             </a:br>
             <a:br>
-              <a:rPr lang="en-US" sz="4400"/>
+              <a:rPr lang="en-US" sz="4400" dirty="0"/>
             </a:br>
             <a:r>
-              <a:rPr lang="en-US" sz="3600"/>
+              <a:rPr lang="en-US" sz="3600" dirty="0"/>
               <a:t>System can be used by anyone, Specifically Targeted at:</a:t>
             </a:r>
-            <a:endParaRPr lang="en-US" sz="3600" i="1"/>
+            <a:endParaRPr lang="en-US" sz="3600" i="1" dirty="0"/>
           </a:p>
         </p:txBody>
       </p:sp>
@@ -47528,12 +47504,12 @@
 </file>
 
 <file path=customXml/item1.xml><?xml version="1.0" encoding="utf-8"?>
-<?mso-contentType ?>
-<FormTemplates xmlns="http://schemas.microsoft.com/sharepoint/v3/contenttype/forms">
-  <Display>DocumentLibraryForm</Display>
-  <Edit>DocumentLibraryForm</Edit>
-  <New>DocumentLibraryForm</New>
-</FormTemplates>
+<p:properties xmlns:p="http://schemas.microsoft.com/office/2006/metadata/properties" xmlns:xsi="http://www.w3.org/2001/XMLSchema-instance" xmlns:pc="http://schemas.microsoft.com/office/infopath/2007/PartnerControls">
+  <documentManagement>
+    <Status xmlns="71af3243-3dd4-4a8d-8c0d-dd76da1f02a5">Not started</Status>
+    <MediaServiceKeyPoints xmlns="71af3243-3dd4-4a8d-8c0d-dd76da1f02a5" xsi:nil="true"/>
+  </documentManagement>
+</p:properties>
 </file>
 
 <file path=customXml/item2.xml><?xml version="1.0" encoding="utf-8"?>
@@ -47758,18 +47734,20 @@
 </file>
 
 <file path=customXml/item3.xml><?xml version="1.0" encoding="utf-8"?>
-<p:properties xmlns:p="http://schemas.microsoft.com/office/2006/metadata/properties" xmlns:xsi="http://www.w3.org/2001/XMLSchema-instance" xmlns:pc="http://schemas.microsoft.com/office/infopath/2007/PartnerControls">
-  <documentManagement>
-    <Status xmlns="71af3243-3dd4-4a8d-8c0d-dd76da1f02a5">Not started</Status>
-    <MediaServiceKeyPoints xmlns="71af3243-3dd4-4a8d-8c0d-dd76da1f02a5" xsi:nil="true"/>
-  </documentManagement>
-</p:properties>
+<?mso-contentType ?>
+<FormTemplates xmlns="http://schemas.microsoft.com/sharepoint/v3/contenttype/forms">
+  <Display>DocumentLibraryForm</Display>
+  <Edit>DocumentLibraryForm</Edit>
+  <New>DocumentLibraryForm</New>
+</FormTemplates>
 </file>
 
 <file path=customXml/itemProps1.xml><?xml version="1.0" encoding="utf-8"?>
-<ds:datastoreItem xmlns:ds="http://schemas.openxmlformats.org/officeDocument/2006/customXml" ds:itemID="{D8A49B05-820E-4F16-BCC1-12B2E13002E2}">
+<ds:datastoreItem xmlns:ds="http://schemas.openxmlformats.org/officeDocument/2006/customXml" ds:itemID="{F2AD9EFA-E074-4C2F-8F25-BF862B8AB684}">
   <ds:schemaRefs>
-    <ds:schemaRef ds:uri="http://schemas.microsoft.com/sharepoint/v3/contenttype/forms"/>
+    <ds:schemaRef ds:uri="71af3243-3dd4-4a8d-8c0d-dd76da1f02a5"/>
+    <ds:schemaRef ds:uri="http://schemas.microsoft.com/office/2006/metadata/properties"/>
+    <ds:schemaRef ds:uri="http://schemas.microsoft.com/office/infopath/2007/PartnerControls"/>
   </ds:schemaRefs>
 </ds:datastoreItem>
 </file>
@@ -47794,11 +47772,9 @@
 </file>
 
 <file path=customXml/itemProps3.xml><?xml version="1.0" encoding="utf-8"?>
-<ds:datastoreItem xmlns:ds="http://schemas.openxmlformats.org/officeDocument/2006/customXml" ds:itemID="{F2AD9EFA-E074-4C2F-8F25-BF862B8AB684}">
+<ds:datastoreItem xmlns:ds="http://schemas.openxmlformats.org/officeDocument/2006/customXml" ds:itemID="{D8A49B05-820E-4F16-BCC1-12B2E13002E2}">
   <ds:schemaRefs>
-    <ds:schemaRef ds:uri="71af3243-3dd4-4a8d-8c0d-dd76da1f02a5"/>
-    <ds:schemaRef ds:uri="http://schemas.microsoft.com/office/2006/metadata/properties"/>
-    <ds:schemaRef ds:uri="http://schemas.microsoft.com/office/infopath/2007/PartnerControls"/>
+    <ds:schemaRef ds:uri="http://schemas.microsoft.com/sharepoint/v3/contenttype/forms"/>
   </ds:schemaRefs>
 </ds:datastoreItem>
 </file>
</xml_diff>